<commit_message>
Atualização Slide (parte Diego)
Parte de Sistemas distribuidos
</commit_message>
<xml_diff>
--- a/EzMartGit/Documento/FAI_PFC_Apresentação_Agosto2018.pptx
+++ b/EzMartGit/Documento/FAI_PFC_Apresentação_Agosto2018.pptx
@@ -210,7 +210,7 @@
   </p:defaultTextStyle>
   <p:extLst>
     <p:ext uri="{EFAFB233-063F-42B5-8137-9DF3F51BA10A}">
-      <p15:sldGuideLst xmlns:p15="http://schemas.microsoft.com/office/powerpoint/2012/main" xmlns="">
+      <p15:sldGuideLst xmlns="" xmlns:p15="http://schemas.microsoft.com/office/powerpoint/2012/main">
         <p15:guide id="1" orient="horz" pos="2160">
           <p15:clr>
             <a:srgbClr val="A4A3A4"/>
@@ -224,7 +224,7 @@
       </p15:sldGuideLst>
     </p:ext>
     <p:ext uri="{2D200454-40CA-4A62-9FC3-DE9A4176ACB9}">
-      <p15:notesGuideLst xmlns:p15="http://schemas.microsoft.com/office/powerpoint/2012/main" xmlns="">
+      <p15:notesGuideLst xmlns="" xmlns:p15="http://schemas.microsoft.com/office/powerpoint/2012/main">
         <p15:guide id="1" orient="horz" pos="3128">
           <p15:clr>
             <a:srgbClr val="A4A3A4"/>
@@ -14214,7 +14214,7 @@
   </p:clrMapOvr>
   <p:extLst mod="1">
     <p:ext uri="{DCECCB84-F9BA-43D5-87BE-67443E8EF086}">
-      <p15:sldGuideLst xmlns:p15="http://schemas.microsoft.com/office/powerpoint/2012/main" xmlns=""/>
+      <p15:sldGuideLst xmlns="" xmlns:p15="http://schemas.microsoft.com/office/powerpoint/2012/main"/>
     </p:ext>
   </p:extLst>
 </p:sldLayout>
@@ -14599,7 +14599,7 @@
   </p:clrMapOvr>
   <p:extLst mod="1">
     <p:ext uri="{DCECCB84-F9BA-43D5-87BE-67443E8EF086}">
-      <p15:sldGuideLst xmlns:p15="http://schemas.microsoft.com/office/powerpoint/2012/main" xmlns=""/>
+      <p15:sldGuideLst xmlns="" xmlns:p15="http://schemas.microsoft.com/office/powerpoint/2012/main"/>
     </p:ext>
   </p:extLst>
 </p:sldLayout>
@@ -15069,7 +15069,7 @@
   </p:clrMapOvr>
   <p:extLst mod="1">
     <p:ext uri="{DCECCB84-F9BA-43D5-87BE-67443E8EF086}">
-      <p15:sldGuideLst xmlns:p15="http://schemas.microsoft.com/office/powerpoint/2012/main" xmlns=""/>
+      <p15:sldGuideLst xmlns="" xmlns:p15="http://schemas.microsoft.com/office/powerpoint/2012/main"/>
     </p:ext>
   </p:extLst>
 </p:sldLayout>
@@ -15910,7 +15910,7 @@
   </p:txStyles>
   <p:extLst mod="1">
     <p:ext uri="{27BBF7A9-308A-43DC-89C8-2F10F3537804}">
-      <p15:sldGuideLst xmlns:p15="http://schemas.microsoft.com/office/powerpoint/2012/main" xmlns=""/>
+      <p15:sldGuideLst xmlns="" xmlns:p15="http://schemas.microsoft.com/office/powerpoint/2012/main"/>
     </p:ext>
   </p:extLst>
 </p:sldMaster>
@@ -46007,14 +46007,7 @@
                 <a:latin typeface="Arial" panose="020B0604020202020204" pitchFamily="34" charset="0"/>
                 <a:cs typeface="Arial" panose="020B0604020202020204" pitchFamily="34" charset="0"/>
               </a:rPr>
-              <a:t>dados</a:t>
-            </a:r>
-            <a:r>
-              <a:rPr lang="pt-BR" sz="1600" b="1" dirty="0" smtClean="0">
-                <a:latin typeface="Arial" panose="020B0604020202020204" pitchFamily="34" charset="0"/>
-                <a:cs typeface="Arial" panose="020B0604020202020204" pitchFamily="34" charset="0"/>
-              </a:rPr>
-              <a:t>;</a:t>
+              <a:t>dados;</a:t>
             </a:r>
           </a:p>
           <a:p>
@@ -50974,12 +50967,22 @@
                 <a:latin typeface="Arial" panose="020B0604020202020204" pitchFamily="34" charset="0"/>
                 <a:cs typeface="Arial" panose="020B0604020202020204" pitchFamily="34" charset="0"/>
               </a:rPr>
-              <a:t>Heterogeneidade;</a:t>
-            </a:r>
-            <a:endParaRPr lang="pt-BR" dirty="0">
-              <a:latin typeface="Arial" panose="020B0604020202020204" pitchFamily="34" charset="0"/>
-              <a:cs typeface="Arial" panose="020B0604020202020204" pitchFamily="34" charset="0"/>
-            </a:endParaRPr>
+              <a:t>Heterogeneidade (Java Virtual </a:t>
+            </a:r>
+            <a:r>
+              <a:rPr lang="pt-BR" i="1" dirty="0" err="1" smtClean="0">
+                <a:latin typeface="Arial" panose="020B0604020202020204" pitchFamily="34" charset="0"/>
+                <a:cs typeface="Arial" panose="020B0604020202020204" pitchFamily="34" charset="0"/>
+              </a:rPr>
+              <a:t>Machine</a:t>
+            </a:r>
+            <a:r>
+              <a:rPr lang="pt-BR" dirty="0" smtClean="0">
+                <a:latin typeface="Arial" panose="020B0604020202020204" pitchFamily="34" charset="0"/>
+                <a:cs typeface="Arial" panose="020B0604020202020204" pitchFamily="34" charset="0"/>
+              </a:rPr>
+              <a:t>);</a:t>
+            </a:r>
           </a:p>
           <a:p>
             <a:pPr marL="742950" lvl="1" indent="-285750" algn="just">
@@ -50994,8 +50997,26 @@
                 <a:latin typeface="Arial" panose="020B0604020202020204" pitchFamily="34" charset="0"/>
                 <a:cs typeface="Arial" panose="020B0604020202020204" pitchFamily="34" charset="0"/>
               </a:rPr>
-              <a:t>Sistemas abertos;</a:t>
-            </a:r>
+              <a:t>Sistemas abertos (</a:t>
+            </a:r>
+            <a:r>
+              <a:rPr lang="pt-BR" i="1" dirty="0" err="1" smtClean="0">
+                <a:latin typeface="Arial" panose="020B0604020202020204" pitchFamily="34" charset="0"/>
+                <a:cs typeface="Arial" panose="020B0604020202020204" pitchFamily="34" charset="0"/>
+              </a:rPr>
+              <a:t>Swagger</a:t>
+            </a:r>
+            <a:r>
+              <a:rPr lang="pt-BR" dirty="0" smtClean="0">
+                <a:latin typeface="Arial" panose="020B0604020202020204" pitchFamily="34" charset="0"/>
+                <a:cs typeface="Arial" panose="020B0604020202020204" pitchFamily="34" charset="0"/>
+              </a:rPr>
+              <a:t>);</a:t>
+            </a:r>
+            <a:endParaRPr lang="pt-BR" dirty="0" smtClean="0">
+              <a:latin typeface="Arial" panose="020B0604020202020204" pitchFamily="34" charset="0"/>
+              <a:cs typeface="Arial" panose="020B0604020202020204" pitchFamily="34" charset="0"/>
+            </a:endParaRPr>
           </a:p>
           <a:p>
             <a:pPr marL="742950" lvl="1" indent="-285750" algn="just">
@@ -51010,8 +51031,12 @@
                 <a:latin typeface="Arial" panose="020B0604020202020204" pitchFamily="34" charset="0"/>
                 <a:cs typeface="Arial" panose="020B0604020202020204" pitchFamily="34" charset="0"/>
               </a:rPr>
-              <a:t>Segurança;</a:t>
-            </a:r>
+              <a:t>Segurança (HTTPS);</a:t>
+            </a:r>
+            <a:endParaRPr lang="pt-BR" dirty="0" smtClean="0">
+              <a:latin typeface="Arial" panose="020B0604020202020204" pitchFamily="34" charset="0"/>
+              <a:cs typeface="Arial" panose="020B0604020202020204" pitchFamily="34" charset="0"/>
+            </a:endParaRPr>
           </a:p>
           <a:p>
             <a:pPr marL="742950" lvl="1" indent="-285750" algn="just">
@@ -51026,8 +51051,26 @@
                 <a:latin typeface="Arial" panose="020B0604020202020204" pitchFamily="34" charset="0"/>
                 <a:cs typeface="Arial" panose="020B0604020202020204" pitchFamily="34" charset="0"/>
               </a:rPr>
-              <a:t>Escalabilidade;</a:t>
-            </a:r>
+              <a:t>Escalabilidade (Apache </a:t>
+            </a:r>
+            <a:r>
+              <a:rPr lang="pt-BR" dirty="0" err="1" smtClean="0">
+                <a:latin typeface="Arial" panose="020B0604020202020204" pitchFamily="34" charset="0"/>
+                <a:cs typeface="Arial" panose="020B0604020202020204" pitchFamily="34" charset="0"/>
+              </a:rPr>
+              <a:t>Tomcat</a:t>
+            </a:r>
+            <a:r>
+              <a:rPr lang="pt-BR" dirty="0" smtClean="0">
+                <a:latin typeface="Arial" panose="020B0604020202020204" pitchFamily="34" charset="0"/>
+                <a:cs typeface="Arial" panose="020B0604020202020204" pitchFamily="34" charset="0"/>
+              </a:rPr>
+              <a:t>);</a:t>
+            </a:r>
+            <a:endParaRPr lang="pt-BR" dirty="0" smtClean="0">
+              <a:latin typeface="Arial" panose="020B0604020202020204" pitchFamily="34" charset="0"/>
+              <a:cs typeface="Arial" panose="020B0604020202020204" pitchFamily="34" charset="0"/>
+            </a:endParaRPr>
           </a:p>
           <a:p>
             <a:pPr marL="742950" lvl="1" indent="-285750" algn="just">
@@ -51042,8 +51085,47 @@
                 <a:latin typeface="Arial" panose="020B0604020202020204" pitchFamily="34" charset="0"/>
                 <a:cs typeface="Arial" panose="020B0604020202020204" pitchFamily="34" charset="0"/>
               </a:rPr>
-              <a:t>Tratamento de falhas;</a:t>
-            </a:r>
+              <a:t>Tratamento de </a:t>
+            </a:r>
+            <a:r>
+              <a:rPr lang="pt-BR" dirty="0" smtClean="0">
+                <a:latin typeface="Arial" panose="020B0604020202020204" pitchFamily="34" charset="0"/>
+                <a:cs typeface="Arial" panose="020B0604020202020204" pitchFamily="34" charset="0"/>
+              </a:rPr>
+              <a:t>falhas (recursos Apache </a:t>
+            </a:r>
+            <a:r>
+              <a:rPr lang="pt-BR" dirty="0" err="1" smtClean="0">
+                <a:latin typeface="Arial" panose="020B0604020202020204" pitchFamily="34" charset="0"/>
+                <a:cs typeface="Arial" panose="020B0604020202020204" pitchFamily="34" charset="0"/>
+              </a:rPr>
+              <a:t>Tomcat</a:t>
+            </a:r>
+            <a:r>
+              <a:rPr lang="pt-BR" dirty="0" smtClean="0">
+                <a:latin typeface="Arial" panose="020B0604020202020204" pitchFamily="34" charset="0"/>
+                <a:cs typeface="Arial" panose="020B0604020202020204" pitchFamily="34" charset="0"/>
+              </a:rPr>
+              <a:t>, </a:t>
+            </a:r>
+            <a:r>
+              <a:rPr lang="pt-BR" dirty="0" err="1" smtClean="0">
+                <a:latin typeface="Arial" panose="020B0604020202020204" pitchFamily="34" charset="0"/>
+                <a:cs typeface="Arial" panose="020B0604020202020204" pitchFamily="34" charset="0"/>
+              </a:rPr>
+              <a:t>Postgres</a:t>
+            </a:r>
+            <a:r>
+              <a:rPr lang="pt-BR" dirty="0" smtClean="0">
+                <a:latin typeface="Arial" panose="020B0604020202020204" pitchFamily="34" charset="0"/>
+                <a:cs typeface="Arial" panose="020B0604020202020204" pitchFamily="34" charset="0"/>
+              </a:rPr>
+              <a:t>);</a:t>
+            </a:r>
+            <a:endParaRPr lang="pt-BR" dirty="0" smtClean="0">
+              <a:latin typeface="Arial" panose="020B0604020202020204" pitchFamily="34" charset="0"/>
+              <a:cs typeface="Arial" panose="020B0604020202020204" pitchFamily="34" charset="0"/>
+            </a:endParaRPr>
           </a:p>
           <a:p>
             <a:pPr marL="742950" lvl="1" indent="-285750" algn="just">
@@ -51058,8 +51140,26 @@
                 <a:latin typeface="Arial" panose="020B0604020202020204" pitchFamily="34" charset="0"/>
                 <a:cs typeface="Arial" panose="020B0604020202020204" pitchFamily="34" charset="0"/>
               </a:rPr>
-              <a:t>Concorrência;</a:t>
-            </a:r>
+              <a:t>Concorrência (</a:t>
+            </a:r>
+            <a:r>
+              <a:rPr lang="pt-BR" dirty="0" err="1" smtClean="0">
+                <a:latin typeface="Arial" panose="020B0604020202020204" pitchFamily="34" charset="0"/>
+                <a:cs typeface="Arial" panose="020B0604020202020204" pitchFamily="34" charset="0"/>
+              </a:rPr>
+              <a:t>Pull</a:t>
+            </a:r>
+            <a:r>
+              <a:rPr lang="pt-BR" dirty="0" smtClean="0">
+                <a:latin typeface="Arial" panose="020B0604020202020204" pitchFamily="34" charset="0"/>
+                <a:cs typeface="Arial" panose="020B0604020202020204" pitchFamily="34" charset="0"/>
+              </a:rPr>
+              <a:t> de conexões);</a:t>
+            </a:r>
+            <a:endParaRPr lang="pt-BR" dirty="0" smtClean="0">
+              <a:latin typeface="Arial" panose="020B0604020202020204" pitchFamily="34" charset="0"/>
+              <a:cs typeface="Arial" panose="020B0604020202020204" pitchFamily="34" charset="0"/>
+            </a:endParaRPr>
           </a:p>
           <a:p>
             <a:pPr marL="742950" lvl="1" indent="-285750" algn="just">
@@ -51074,8 +51174,12 @@
                 <a:latin typeface="Arial" panose="020B0604020202020204" pitchFamily="34" charset="0"/>
                 <a:cs typeface="Arial" panose="020B0604020202020204" pitchFamily="34" charset="0"/>
               </a:rPr>
-              <a:t>Transparência.</a:t>
-            </a:r>
+              <a:t>Transparência .</a:t>
+            </a:r>
+            <a:endParaRPr lang="pt-BR" dirty="0" smtClean="0">
+              <a:latin typeface="Arial" panose="020B0604020202020204" pitchFamily="34" charset="0"/>
+              <a:cs typeface="Arial" panose="020B0604020202020204" pitchFamily="34" charset="0"/>
+            </a:endParaRPr>
           </a:p>
         </p:txBody>
       </p:sp>
@@ -56886,7 +56990,7 @@
   <a:extraClrSchemeLst/>
   <a:extLst>
     <a:ext uri="{05A4C25C-085E-4340-85A3-A5531E510DB2}">
-      <thm15:themeFamily xmlns:thm15="http://schemas.microsoft.com/office/thememl/2012/main" xmlns="" name="Vapor Trail" id="{4FDF2955-7D9C-493C-B9F9-C205151B46CD}" vid="{8F31A783-2159-4870-BC29-2BA7D038EA44}"/>
+      <thm15:themeFamily xmlns="" xmlns:thm15="http://schemas.microsoft.com/office/thememl/2012/main" name="Vapor Trail" id="{4FDF2955-7D9C-493C-B9F9-C205151B46CD}" vid="{8F31A783-2159-4870-BC29-2BA7D038EA44}"/>
     </a:ext>
   </a:extLst>
 </a:theme>

</xml_diff>

<commit_message>
Alteração Sumario do Slides.
Retirado o item 6 do sumario do Slide e remanejado os numeros corretamente.
</commit_message>
<xml_diff>
--- a/EzMartGit/Documento/FAI_PFC_Apresentação_Agosto2018.pptx
+++ b/EzMartGit/Documento/FAI_PFC_Apresentação_Agosto2018.pptx
@@ -210,7 +210,7 @@
   </p:defaultTextStyle>
   <p:extLst>
     <p:ext uri="{EFAFB233-063F-42B5-8137-9DF3F51BA10A}">
-      <p15:sldGuideLst xmlns="" xmlns:p15="http://schemas.microsoft.com/office/powerpoint/2012/main">
+      <p15:sldGuideLst xmlns:p15="http://schemas.microsoft.com/office/powerpoint/2012/main" xmlns="">
         <p15:guide id="1" orient="horz" pos="2160">
           <p15:clr>
             <a:srgbClr val="A4A3A4"/>
@@ -224,7 +224,7 @@
       </p15:sldGuideLst>
     </p:ext>
     <p:ext uri="{2D200454-40CA-4A62-9FC3-DE9A4176ACB9}">
-      <p15:notesGuideLst xmlns="" xmlns:p15="http://schemas.microsoft.com/office/powerpoint/2012/main">
+      <p15:notesGuideLst xmlns:p15="http://schemas.microsoft.com/office/powerpoint/2012/main" xmlns="">
         <p15:guide id="1" orient="horz" pos="3128">
           <p15:clr>
             <a:srgbClr val="A4A3A4"/>
@@ -14214,7 +14214,7 @@
   </p:clrMapOvr>
   <p:extLst mod="1">
     <p:ext uri="{DCECCB84-F9BA-43D5-87BE-67443E8EF086}">
-      <p15:sldGuideLst xmlns="" xmlns:p15="http://schemas.microsoft.com/office/powerpoint/2012/main"/>
+      <p15:sldGuideLst xmlns:p15="http://schemas.microsoft.com/office/powerpoint/2012/main" xmlns=""/>
     </p:ext>
   </p:extLst>
 </p:sldLayout>
@@ -14599,7 +14599,7 @@
   </p:clrMapOvr>
   <p:extLst mod="1">
     <p:ext uri="{DCECCB84-F9BA-43D5-87BE-67443E8EF086}">
-      <p15:sldGuideLst xmlns="" xmlns:p15="http://schemas.microsoft.com/office/powerpoint/2012/main"/>
+      <p15:sldGuideLst xmlns:p15="http://schemas.microsoft.com/office/powerpoint/2012/main" xmlns=""/>
     </p:ext>
   </p:extLst>
 </p:sldLayout>
@@ -15069,7 +15069,7 @@
   </p:clrMapOvr>
   <p:extLst mod="1">
     <p:ext uri="{DCECCB84-F9BA-43D5-87BE-67443E8EF086}">
-      <p15:sldGuideLst xmlns="" xmlns:p15="http://schemas.microsoft.com/office/powerpoint/2012/main"/>
+      <p15:sldGuideLst xmlns:p15="http://schemas.microsoft.com/office/powerpoint/2012/main" xmlns=""/>
     </p:ext>
   </p:extLst>
 </p:sldLayout>
@@ -15910,7 +15910,7 @@
   </p:txStyles>
   <p:extLst mod="1">
     <p:ext uri="{27BBF7A9-308A-43DC-89C8-2F10F3537804}">
-      <p15:sldGuideLst xmlns="" xmlns:p15="http://schemas.microsoft.com/office/powerpoint/2012/main"/>
+      <p15:sldGuideLst xmlns:p15="http://schemas.microsoft.com/office/powerpoint/2012/main" xmlns=""/>
     </p:ext>
   </p:extLst>
 </p:sldMaster>
@@ -37975,7 +37975,7 @@
         <p:spPr>
           <a:xfrm>
             <a:off x="155575" y="1988840"/>
-            <a:ext cx="8664897" cy="2862322"/>
+            <a:ext cx="8664897" cy="2308324"/>
           </a:xfrm>
           <a:prstGeom prst="rect">
             <a:avLst/>
@@ -38045,23 +38045,12 @@
                 <a:latin typeface="Arial" panose="020B0604020202020204" pitchFamily="34" charset="0"/>
                 <a:cs typeface="Arial" panose="020B0604020202020204" pitchFamily="34" charset="0"/>
               </a:rPr>
-              <a:t>Casos de Uso – Demonstrações e Testes</a:t>
-            </a:r>
-          </a:p>
-          <a:p>
-            <a:pPr marL="342900" indent="-342900" algn="just">
-              <a:lnSpc>
-                <a:spcPct val="200000"/>
-              </a:lnSpc>
-              <a:buAutoNum type="arabicPeriod" startAt="6"/>
-            </a:pPr>
-            <a:r>
-              <a:rPr lang="pt-BR" b="1" dirty="0" smtClean="0">
-                <a:latin typeface="Arial" panose="020B0604020202020204" pitchFamily="34" charset="0"/>
-                <a:cs typeface="Arial" panose="020B0604020202020204" pitchFamily="34" charset="0"/>
-              </a:rPr>
               <a:t>Conclusão </a:t>
             </a:r>
+            <a:endParaRPr lang="pt-BR" b="1" dirty="0" smtClean="0">
+              <a:latin typeface="Arial" panose="020B0604020202020204" pitchFamily="34" charset="0"/>
+              <a:cs typeface="Arial" panose="020B0604020202020204" pitchFamily="34" charset="0"/>
+            </a:endParaRPr>
           </a:p>
           <a:p>
             <a:pPr marL="342900" indent="-342900" algn="just">
@@ -52655,14 +52644,7 @@
                 <a:latin typeface="Arial" panose="020B0604020202020204" pitchFamily="34" charset="0"/>
                 <a:cs typeface="Arial" panose="020B0604020202020204" pitchFamily="34" charset="0"/>
               </a:rPr>
-              <a:t>6. </a:t>
-            </a:r>
-            <a:r>
-              <a:rPr lang="pt-BR" sz="2800" b="1" dirty="0" smtClean="0">
-                <a:latin typeface="Arial" panose="020B0604020202020204" pitchFamily="34" charset="0"/>
-                <a:cs typeface="Arial" panose="020B0604020202020204" pitchFamily="34" charset="0"/>
-              </a:rPr>
-              <a:t>Conclusão</a:t>
+              <a:t>6. Conclusão</a:t>
             </a:r>
             <a:endParaRPr lang="pt-BR" sz="1600" b="1" dirty="0" smtClean="0">
               <a:latin typeface="Arial" panose="020B0604020202020204" pitchFamily="34" charset="0"/>
@@ -53049,14 +53031,7 @@
                 <a:latin typeface="Arial" panose="020B0604020202020204" pitchFamily="34" charset="0"/>
                 <a:cs typeface="Arial" panose="020B0604020202020204" pitchFamily="34" charset="0"/>
               </a:rPr>
-              <a:t>7. </a:t>
-            </a:r>
-            <a:r>
-              <a:rPr lang="pt-BR" sz="2800" b="1" dirty="0" smtClean="0">
-                <a:latin typeface="Arial" panose="020B0604020202020204" pitchFamily="34" charset="0"/>
-                <a:cs typeface="Arial" panose="020B0604020202020204" pitchFamily="34" charset="0"/>
-              </a:rPr>
-              <a:t>Referências</a:t>
+              <a:t>7. Referências</a:t>
             </a:r>
             <a:endParaRPr lang="pt-BR" sz="1600" b="1" dirty="0" smtClean="0">
               <a:latin typeface="Arial" panose="020B0604020202020204" pitchFamily="34" charset="0"/>
@@ -53118,14 +53093,7 @@
                 <a:latin typeface="Arial" panose="020B0604020202020204" pitchFamily="34" charset="0"/>
                 <a:cs typeface="Arial" panose="020B0604020202020204" pitchFamily="34" charset="0"/>
               </a:rPr>
-              <a:t>ASSOCIAÇÃO BRASILEIRA DE SUPERMERCADOS (ABRAS). Guia Abras de Marcas Próprias. São Paulo: ABRAS, 2011</a:t>
-            </a:r>
-            <a:r>
-              <a:rPr lang="pt-BR" dirty="0">
-                <a:latin typeface="Arial" panose="020B0604020202020204" pitchFamily="34" charset="0"/>
-                <a:cs typeface="Arial" panose="020B0604020202020204" pitchFamily="34" charset="0"/>
-              </a:rPr>
-              <a:t>.</a:t>
+              <a:t>ASSOCIAÇÃO BRASILEIRA DE SUPERMERCADOS (ABRAS). Guia Abras de Marcas Próprias. São Paulo: ABRAS, 2011.</a:t>
             </a:r>
           </a:p>
           <a:p>
@@ -53528,14 +53496,7 @@
                 <a:latin typeface="Arial" panose="020B0604020202020204" pitchFamily="34" charset="0"/>
                 <a:cs typeface="Arial" panose="020B0604020202020204" pitchFamily="34" charset="0"/>
               </a:rPr>
-              <a:t>7. </a:t>
-            </a:r>
-            <a:r>
-              <a:rPr lang="pt-BR" sz="2800" b="1" dirty="0" smtClean="0">
-                <a:latin typeface="Arial" panose="020B0604020202020204" pitchFamily="34" charset="0"/>
-                <a:cs typeface="Arial" panose="020B0604020202020204" pitchFamily="34" charset="0"/>
-              </a:rPr>
-              <a:t>Referências</a:t>
+              <a:t>7. Referências</a:t>
             </a:r>
             <a:endParaRPr lang="pt-BR" sz="1600" b="1" dirty="0" smtClean="0">
               <a:latin typeface="Arial" panose="020B0604020202020204" pitchFamily="34" charset="0"/>
@@ -54014,14 +53975,7 @@
                 <a:latin typeface="Arial" panose="020B0604020202020204" pitchFamily="34" charset="0"/>
                 <a:cs typeface="Arial" panose="020B0604020202020204" pitchFamily="34" charset="0"/>
               </a:rPr>
-              <a:t>7. </a:t>
-            </a:r>
-            <a:r>
-              <a:rPr lang="pt-BR" sz="2800" b="1" dirty="0" smtClean="0">
-                <a:latin typeface="Arial" panose="020B0604020202020204" pitchFamily="34" charset="0"/>
-                <a:cs typeface="Arial" panose="020B0604020202020204" pitchFamily="34" charset="0"/>
-              </a:rPr>
-              <a:t>Referências</a:t>
+              <a:t>7. Referências</a:t>
             </a:r>
             <a:endParaRPr lang="pt-BR" sz="1600" b="1" dirty="0" smtClean="0">
               <a:latin typeface="Arial" panose="020B0604020202020204" pitchFamily="34" charset="0"/>
@@ -54463,14 +54417,7 @@
                 <a:latin typeface="Arial" panose="020B0604020202020204" pitchFamily="34" charset="0"/>
                 <a:cs typeface="Arial" panose="020B0604020202020204" pitchFamily="34" charset="0"/>
               </a:rPr>
-              <a:t>7. </a:t>
-            </a:r>
-            <a:r>
-              <a:rPr lang="pt-BR" sz="2800" b="1" dirty="0" smtClean="0">
-                <a:latin typeface="Arial" panose="020B0604020202020204" pitchFamily="34" charset="0"/>
-                <a:cs typeface="Arial" panose="020B0604020202020204" pitchFamily="34" charset="0"/>
-              </a:rPr>
-              <a:t>Referências</a:t>
+              <a:t>7. Referências</a:t>
             </a:r>
             <a:endParaRPr lang="pt-BR" sz="1600" b="1" dirty="0" smtClean="0">
               <a:latin typeface="Arial" panose="020B0604020202020204" pitchFamily="34" charset="0"/>
@@ -54935,14 +54882,7 @@
                 <a:latin typeface="Arial" panose="020B0604020202020204" pitchFamily="34" charset="0"/>
                 <a:cs typeface="Arial" panose="020B0604020202020204" pitchFamily="34" charset="0"/>
               </a:rPr>
-              <a:t>7. </a:t>
-            </a:r>
-            <a:r>
-              <a:rPr lang="pt-BR" sz="2800" b="1" dirty="0" smtClean="0">
-                <a:latin typeface="Arial" panose="020B0604020202020204" pitchFamily="34" charset="0"/>
-                <a:cs typeface="Arial" panose="020B0604020202020204" pitchFamily="34" charset="0"/>
-              </a:rPr>
-              <a:t>Referências</a:t>
+              <a:t>7. Referências</a:t>
             </a:r>
             <a:endParaRPr lang="pt-BR" sz="1600" b="1" dirty="0" smtClean="0">
               <a:latin typeface="Arial" panose="020B0604020202020204" pitchFamily="34" charset="0"/>
@@ -55392,14 +55332,7 @@
                 <a:latin typeface="Arial" panose="020B0604020202020204" pitchFamily="34" charset="0"/>
                 <a:cs typeface="Arial" panose="020B0604020202020204" pitchFamily="34" charset="0"/>
               </a:rPr>
-              <a:t>7. </a:t>
-            </a:r>
-            <a:r>
-              <a:rPr lang="pt-BR" sz="2800" b="1" dirty="0" smtClean="0">
-                <a:latin typeface="Arial" panose="020B0604020202020204" pitchFamily="34" charset="0"/>
-                <a:cs typeface="Arial" panose="020B0604020202020204" pitchFamily="34" charset="0"/>
-              </a:rPr>
-              <a:t>Referências</a:t>
+              <a:t>7. Referências</a:t>
             </a:r>
             <a:endParaRPr lang="pt-BR" sz="1600" b="1" dirty="0" smtClean="0">
               <a:latin typeface="Arial" panose="020B0604020202020204" pitchFamily="34" charset="0"/>
@@ -55578,14 +55511,7 @@
                 <a:latin typeface="Arial" panose="020B0604020202020204" pitchFamily="34" charset="0"/>
                 <a:cs typeface="Arial" panose="020B0604020202020204" pitchFamily="34" charset="0"/>
               </a:rPr>
-              <a:t>, Mauro. </a:t>
-            </a:r>
-            <a:r>
-              <a:rPr lang="pt-BR" dirty="0">
-                <a:latin typeface="Arial" panose="020B0604020202020204" pitchFamily="34" charset="0"/>
-                <a:cs typeface="Arial" panose="020B0604020202020204" pitchFamily="34" charset="0"/>
-              </a:rPr>
-              <a:t>GASTOMETRO: desenvolvimento de um aplicativo </a:t>
+              <a:t>, Mauro. GASTOMETRO: desenvolvimento de um aplicativo </a:t>
             </a:r>
             <a:r>
               <a:rPr lang="pt-BR" dirty="0" err="1">
@@ -55864,14 +55790,7 @@
                 <a:latin typeface="Arial" panose="020B0604020202020204" pitchFamily="34" charset="0"/>
                 <a:cs typeface="Arial" panose="020B0604020202020204" pitchFamily="34" charset="0"/>
               </a:rPr>
-              <a:t>7. </a:t>
-            </a:r>
-            <a:r>
-              <a:rPr lang="pt-BR" sz="2800" b="1" dirty="0" smtClean="0">
-                <a:latin typeface="Arial" panose="020B0604020202020204" pitchFamily="34" charset="0"/>
-                <a:cs typeface="Arial" panose="020B0604020202020204" pitchFamily="34" charset="0"/>
-              </a:rPr>
-              <a:t>Referências</a:t>
+              <a:t>7. Referências</a:t>
             </a:r>
             <a:endParaRPr lang="pt-BR" sz="1600" b="1" dirty="0" smtClean="0">
               <a:latin typeface="Arial" panose="020B0604020202020204" pitchFamily="34" charset="0"/>
@@ -56326,14 +56245,7 @@
                 <a:latin typeface="Arial" panose="020B0604020202020204" pitchFamily="34" charset="0"/>
                 <a:cs typeface="Arial" panose="020B0604020202020204" pitchFamily="34" charset="0"/>
               </a:rPr>
-              <a:t>7. </a:t>
-            </a:r>
-            <a:r>
-              <a:rPr lang="pt-BR" sz="2800" b="1" dirty="0" smtClean="0">
-                <a:latin typeface="Arial" panose="020B0604020202020204" pitchFamily="34" charset="0"/>
-                <a:cs typeface="Arial" panose="020B0604020202020204" pitchFamily="34" charset="0"/>
-              </a:rPr>
-              <a:t>Referências</a:t>
+              <a:t>7. Referências</a:t>
             </a:r>
             <a:endParaRPr lang="pt-BR" sz="1600" b="1" dirty="0" smtClean="0">
               <a:latin typeface="Arial" panose="020B0604020202020204" pitchFamily="34" charset="0"/>
@@ -57080,7 +56992,7 @@
   <a:extraClrSchemeLst/>
   <a:extLst>
     <a:ext uri="{05A4C25C-085E-4340-85A3-A5531E510DB2}">
-      <thm15:themeFamily xmlns="" xmlns:thm15="http://schemas.microsoft.com/office/thememl/2012/main" name="Vapor Trail" id="{4FDF2955-7D9C-493C-B9F9-C205151B46CD}" vid="{8F31A783-2159-4870-BC29-2BA7D038EA44}"/>
+      <thm15:themeFamily xmlns:thm15="http://schemas.microsoft.com/office/thememl/2012/main" xmlns="" name="Vapor Trail" id="{4FDF2955-7D9C-493C-B9F9-C205151B46CD}" vid="{8F31A783-2159-4870-BC29-2BA7D038EA44}"/>
     </a:ext>
   </a:extLst>
 </a:theme>

</xml_diff>